<commit_message>
INP solutions discussion and schemes: minor fixes
</commit_message>
<xml_diff>
--- a/doc/thesis/figures/analysis/inp/presentation.pptx
+++ b/doc/thesis/figures/analysis/inp/presentation.pptx
@@ -2268,6 +2268,101 @@
     </pc:docChg>
   </pc:docChgLst>
   <pc:docChgLst>
+    <pc:chgData name="Marco Micera" userId="653d34e43499e34c" providerId="LiveId" clId="{3E18B0EE-3304-4FA8-85B7-01C6FB6BA8AC}"/>
+    <pc:docChg chg="custSel addSld modSld">
+      <pc:chgData name="Marco Micera" userId="653d34e43499e34c" providerId="LiveId" clId="{3E18B0EE-3304-4FA8-85B7-01C6FB6BA8AC}" dt="2018-10-19T15:45:58.856" v="185" actId="1076"/>
+      <pc:docMkLst>
+        <pc:docMk/>
+      </pc:docMkLst>
+      <pc:sldChg chg="modSp">
+        <pc:chgData name="Marco Micera" userId="653d34e43499e34c" providerId="LiveId" clId="{3E18B0EE-3304-4FA8-85B7-01C6FB6BA8AC}" dt="2018-10-19T15:25:28.131" v="14" actId="692"/>
+        <pc:sldMkLst>
+          <pc:docMk/>
+          <pc:sldMk cId="3636622696" sldId="259"/>
+        </pc:sldMkLst>
+        <pc:spChg chg="mod">
+          <ac:chgData name="Marco Micera" userId="653d34e43499e34c" providerId="LiveId" clId="{3E18B0EE-3304-4FA8-85B7-01C6FB6BA8AC}" dt="2018-10-19T15:25:28.131" v="14" actId="692"/>
+          <ac:spMkLst>
+            <pc:docMk/>
+            <pc:sldMk cId="3636622696" sldId="259"/>
+            <ac:spMk id="31" creationId="{D443ED90-7BCA-41CC-9C13-E4728ECA847A}"/>
+          </ac:spMkLst>
+        </pc:spChg>
+        <pc:spChg chg="mod">
+          <ac:chgData name="Marco Micera" userId="653d34e43499e34c" providerId="LiveId" clId="{3E18B0EE-3304-4FA8-85B7-01C6FB6BA8AC}" dt="2018-10-19T15:25:24.253" v="13" actId="207"/>
+          <ac:spMkLst>
+            <pc:docMk/>
+            <pc:sldMk cId="3636622696" sldId="259"/>
+            <ac:spMk id="37" creationId="{53F49961-5E10-4C29-A246-C93FB9B7714E}"/>
+          </ac:spMkLst>
+        </pc:spChg>
+      </pc:sldChg>
+      <pc:sldChg chg="addSp delSp modSp add">
+        <pc:chgData name="Marco Micera" userId="653d34e43499e34c" providerId="LiveId" clId="{3E18B0EE-3304-4FA8-85B7-01C6FB6BA8AC}" dt="2018-10-19T15:45:58.856" v="185" actId="1076"/>
+        <pc:sldMkLst>
+          <pc:docMk/>
+          <pc:sldMk cId="285708299" sldId="260"/>
+        </pc:sldMkLst>
+        <pc:spChg chg="mod">
+          <ac:chgData name="Marco Micera" userId="653d34e43499e34c" providerId="LiveId" clId="{3E18B0EE-3304-4FA8-85B7-01C6FB6BA8AC}" dt="2018-10-19T15:41:58.071" v="48" actId="20577"/>
+          <ac:spMkLst>
+            <pc:docMk/>
+            <pc:sldMk cId="285708299" sldId="260"/>
+            <ac:spMk id="2" creationId="{9B849322-5F50-4096-980C-BF997A02A107}"/>
+          </ac:spMkLst>
+        </pc:spChg>
+        <pc:spChg chg="add mod">
+          <ac:chgData name="Marco Micera" userId="653d34e43499e34c" providerId="LiveId" clId="{3E18B0EE-3304-4FA8-85B7-01C6FB6BA8AC}" dt="2018-10-19T15:44:04.521" v="121" actId="1076"/>
+          <ac:spMkLst>
+            <pc:docMk/>
+            <pc:sldMk cId="285708299" sldId="260"/>
+            <ac:spMk id="25" creationId="{70E73D51-4CE7-401E-928C-81434DFCCECA}"/>
+          </ac:spMkLst>
+        </pc:spChg>
+        <pc:spChg chg="del">
+          <ac:chgData name="Marco Micera" userId="653d34e43499e34c" providerId="LiveId" clId="{3E18B0EE-3304-4FA8-85B7-01C6FB6BA8AC}" dt="2018-10-19T15:42:02.252" v="49" actId="478"/>
+          <ac:spMkLst>
+            <pc:docMk/>
+            <pc:sldMk cId="285708299" sldId="260"/>
+            <ac:spMk id="31" creationId="{D443ED90-7BCA-41CC-9C13-E4728ECA847A}"/>
+          </ac:spMkLst>
+        </pc:spChg>
+        <pc:spChg chg="del">
+          <ac:chgData name="Marco Micera" userId="653d34e43499e34c" providerId="LiveId" clId="{3E18B0EE-3304-4FA8-85B7-01C6FB6BA8AC}" dt="2018-10-19T15:42:03.729" v="50" actId="478"/>
+          <ac:spMkLst>
+            <pc:docMk/>
+            <pc:sldMk cId="285708299" sldId="260"/>
+            <ac:spMk id="37" creationId="{53F49961-5E10-4C29-A246-C93FB9B7714E}"/>
+          </ac:spMkLst>
+        </pc:spChg>
+        <pc:spChg chg="add mod">
+          <ac:chgData name="Marco Micera" userId="653d34e43499e34c" providerId="LiveId" clId="{3E18B0EE-3304-4FA8-85B7-01C6FB6BA8AC}" dt="2018-10-19T15:45:58.856" v="185" actId="1076"/>
+          <ac:spMkLst>
+            <pc:docMk/>
+            <pc:sldMk cId="285708299" sldId="260"/>
+            <ac:spMk id="38" creationId="{2E298FD3-467B-439F-8460-DB1439A7D6B5}"/>
+          </ac:spMkLst>
+        </pc:spChg>
+        <pc:cxnChg chg="add mod">
+          <ac:chgData name="Marco Micera" userId="653d34e43499e34c" providerId="LiveId" clId="{3E18B0EE-3304-4FA8-85B7-01C6FB6BA8AC}" dt="2018-10-19T15:43:58.463" v="120" actId="14100"/>
+          <ac:cxnSpMkLst>
+            <pc:docMk/>
+            <pc:sldMk cId="285708299" sldId="260"/>
+            <ac:cxnSpMk id="23" creationId="{0E3E7868-A7F4-4DBF-AC1B-D43DD34B98A6}"/>
+          </ac:cxnSpMkLst>
+        </pc:cxnChg>
+        <pc:cxnChg chg="add mod">
+          <ac:chgData name="Marco Micera" userId="653d34e43499e34c" providerId="LiveId" clId="{3E18B0EE-3304-4FA8-85B7-01C6FB6BA8AC}" dt="2018-10-19T15:45:52.541" v="184" actId="14100"/>
+          <ac:cxnSpMkLst>
+            <pc:docMk/>
+            <pc:sldMk cId="285708299" sldId="260"/>
+            <ac:cxnSpMk id="35" creationId="{65A0BC18-302F-4F73-901B-03B7E3F353B9}"/>
+          </ac:cxnSpMkLst>
+        </pc:cxnChg>
+      </pc:sldChg>
+    </pc:docChg>
+  </pc:docChgLst>
+  <pc:docChgLst>
     <pc:chgData name="Marco Micera" userId="653d34e43499e34c" providerId="LiveId" clId="{E24A04FD-7C8B-404B-A8AD-965821F6DA8E}"/>
     <pc:docChg chg="undo custSel addSld delSld modSld modMainMaster">
       <pc:chgData name="Marco Micera" userId="653d34e43499e34c" providerId="LiveId" clId="{E24A04FD-7C8B-404B-A8AD-965821F6DA8E}" dt="2018-10-19T14:30:44.710" v="839" actId="692"/>
@@ -2611,104 +2706,9 @@
     </pc:docChg>
   </pc:docChgLst>
   <pc:docChgLst>
-    <pc:chgData name="Marco Micera" userId="653d34e43499e34c" providerId="LiveId" clId="{3E18B0EE-3304-4FA8-85B7-01C6FB6BA8AC}"/>
-    <pc:docChg chg="custSel addSld modSld">
-      <pc:chgData name="Marco Micera" userId="653d34e43499e34c" providerId="LiveId" clId="{3E18B0EE-3304-4FA8-85B7-01C6FB6BA8AC}" dt="2018-10-19T15:45:58.856" v="185" actId="1076"/>
-      <pc:docMkLst>
-        <pc:docMk/>
-      </pc:docMkLst>
-      <pc:sldChg chg="modSp">
-        <pc:chgData name="Marco Micera" userId="653d34e43499e34c" providerId="LiveId" clId="{3E18B0EE-3304-4FA8-85B7-01C6FB6BA8AC}" dt="2018-10-19T15:25:28.131" v="14" actId="692"/>
-        <pc:sldMkLst>
-          <pc:docMk/>
-          <pc:sldMk cId="3636622696" sldId="259"/>
-        </pc:sldMkLst>
-        <pc:spChg chg="mod">
-          <ac:chgData name="Marco Micera" userId="653d34e43499e34c" providerId="LiveId" clId="{3E18B0EE-3304-4FA8-85B7-01C6FB6BA8AC}" dt="2018-10-19T15:25:28.131" v="14" actId="692"/>
-          <ac:spMkLst>
-            <pc:docMk/>
-            <pc:sldMk cId="3636622696" sldId="259"/>
-            <ac:spMk id="31" creationId="{D443ED90-7BCA-41CC-9C13-E4728ECA847A}"/>
-          </ac:spMkLst>
-        </pc:spChg>
-        <pc:spChg chg="mod">
-          <ac:chgData name="Marco Micera" userId="653d34e43499e34c" providerId="LiveId" clId="{3E18B0EE-3304-4FA8-85B7-01C6FB6BA8AC}" dt="2018-10-19T15:25:24.253" v="13" actId="207"/>
-          <ac:spMkLst>
-            <pc:docMk/>
-            <pc:sldMk cId="3636622696" sldId="259"/>
-            <ac:spMk id="37" creationId="{53F49961-5E10-4C29-A246-C93FB9B7714E}"/>
-          </ac:spMkLst>
-        </pc:spChg>
-      </pc:sldChg>
-      <pc:sldChg chg="addSp delSp modSp add">
-        <pc:chgData name="Marco Micera" userId="653d34e43499e34c" providerId="LiveId" clId="{3E18B0EE-3304-4FA8-85B7-01C6FB6BA8AC}" dt="2018-10-19T15:45:58.856" v="185" actId="1076"/>
-        <pc:sldMkLst>
-          <pc:docMk/>
-          <pc:sldMk cId="285708299" sldId="260"/>
-        </pc:sldMkLst>
-        <pc:spChg chg="mod">
-          <ac:chgData name="Marco Micera" userId="653d34e43499e34c" providerId="LiveId" clId="{3E18B0EE-3304-4FA8-85B7-01C6FB6BA8AC}" dt="2018-10-19T15:41:58.071" v="48" actId="20577"/>
-          <ac:spMkLst>
-            <pc:docMk/>
-            <pc:sldMk cId="285708299" sldId="260"/>
-            <ac:spMk id="2" creationId="{9B849322-5F50-4096-980C-BF997A02A107}"/>
-          </ac:spMkLst>
-        </pc:spChg>
-        <pc:spChg chg="add mod">
-          <ac:chgData name="Marco Micera" userId="653d34e43499e34c" providerId="LiveId" clId="{3E18B0EE-3304-4FA8-85B7-01C6FB6BA8AC}" dt="2018-10-19T15:44:04.521" v="121" actId="1076"/>
-          <ac:spMkLst>
-            <pc:docMk/>
-            <pc:sldMk cId="285708299" sldId="260"/>
-            <ac:spMk id="25" creationId="{70E73D51-4CE7-401E-928C-81434DFCCECA}"/>
-          </ac:spMkLst>
-        </pc:spChg>
-        <pc:spChg chg="del">
-          <ac:chgData name="Marco Micera" userId="653d34e43499e34c" providerId="LiveId" clId="{3E18B0EE-3304-4FA8-85B7-01C6FB6BA8AC}" dt="2018-10-19T15:42:02.252" v="49" actId="478"/>
-          <ac:spMkLst>
-            <pc:docMk/>
-            <pc:sldMk cId="285708299" sldId="260"/>
-            <ac:spMk id="31" creationId="{D443ED90-7BCA-41CC-9C13-E4728ECA847A}"/>
-          </ac:spMkLst>
-        </pc:spChg>
-        <pc:spChg chg="del">
-          <ac:chgData name="Marco Micera" userId="653d34e43499e34c" providerId="LiveId" clId="{3E18B0EE-3304-4FA8-85B7-01C6FB6BA8AC}" dt="2018-10-19T15:42:03.729" v="50" actId="478"/>
-          <ac:spMkLst>
-            <pc:docMk/>
-            <pc:sldMk cId="285708299" sldId="260"/>
-            <ac:spMk id="37" creationId="{53F49961-5E10-4C29-A246-C93FB9B7714E}"/>
-          </ac:spMkLst>
-        </pc:spChg>
-        <pc:spChg chg="add mod">
-          <ac:chgData name="Marco Micera" userId="653d34e43499e34c" providerId="LiveId" clId="{3E18B0EE-3304-4FA8-85B7-01C6FB6BA8AC}" dt="2018-10-19T15:45:58.856" v="185" actId="1076"/>
-          <ac:spMkLst>
-            <pc:docMk/>
-            <pc:sldMk cId="285708299" sldId="260"/>
-            <ac:spMk id="38" creationId="{2E298FD3-467B-439F-8460-DB1439A7D6B5}"/>
-          </ac:spMkLst>
-        </pc:spChg>
-        <pc:cxnChg chg="add mod">
-          <ac:chgData name="Marco Micera" userId="653d34e43499e34c" providerId="LiveId" clId="{3E18B0EE-3304-4FA8-85B7-01C6FB6BA8AC}" dt="2018-10-19T15:43:58.463" v="120" actId="14100"/>
-          <ac:cxnSpMkLst>
-            <pc:docMk/>
-            <pc:sldMk cId="285708299" sldId="260"/>
-            <ac:cxnSpMk id="23" creationId="{0E3E7868-A7F4-4DBF-AC1B-D43DD34B98A6}"/>
-          </ac:cxnSpMkLst>
-        </pc:cxnChg>
-        <pc:cxnChg chg="add mod">
-          <ac:chgData name="Marco Micera" userId="653d34e43499e34c" providerId="LiveId" clId="{3E18B0EE-3304-4FA8-85B7-01C6FB6BA8AC}" dt="2018-10-19T15:45:52.541" v="184" actId="14100"/>
-          <ac:cxnSpMkLst>
-            <pc:docMk/>
-            <pc:sldMk cId="285708299" sldId="260"/>
-            <ac:cxnSpMk id="35" creationId="{65A0BC18-302F-4F73-901B-03B7E3F353B9}"/>
-          </ac:cxnSpMkLst>
-        </pc:cxnChg>
-      </pc:sldChg>
-    </pc:docChg>
-  </pc:docChgLst>
-  <pc:docChgLst>
     <pc:chgData name="Marco Micera" userId="653d34e43499e34c" providerId="LiveId" clId="{9B4871F7-37E3-4860-B641-C29AE772CF69}"/>
     <pc:docChg chg="undo redo custSel addSld modSld">
-      <pc:chgData name="Marco Micera" userId="653d34e43499e34c" providerId="LiveId" clId="{9B4871F7-37E3-4860-B641-C29AE772CF69}" dt="2018-10-23T23:24:37.932" v="956" actId="1037"/>
+      <pc:chgData name="Marco Micera" userId="653d34e43499e34c" providerId="LiveId" clId="{9B4871F7-37E3-4860-B641-C29AE772CF69}" dt="2018-10-24T10:49:36.719" v="959" actId="692"/>
       <pc:docMkLst>
         <pc:docMk/>
       </pc:docMkLst>
@@ -2740,6 +2740,29 @@
             <pc:docMk/>
             <pc:sldMk cId="1899555995" sldId="265"/>
             <ac:cxnSpMk id="31" creationId="{EDCCA11F-6ECE-4B88-9D74-7ED19E204253}"/>
+          </ac:cxnSpMkLst>
+        </pc:cxnChg>
+      </pc:sldChg>
+      <pc:sldChg chg="modSp">
+        <pc:chgData name="Marco Micera" userId="653d34e43499e34c" providerId="LiveId" clId="{9B4871F7-37E3-4860-B641-C29AE772CF69}" dt="2018-10-24T10:49:36.719" v="959" actId="692"/>
+        <pc:sldMkLst>
+          <pc:docMk/>
+          <pc:sldMk cId="4147652325" sldId="266"/>
+        </pc:sldMkLst>
+        <pc:spChg chg="mod">
+          <ac:chgData name="Marco Micera" userId="653d34e43499e34c" providerId="LiveId" clId="{9B4871F7-37E3-4860-B641-C29AE772CF69}" dt="2018-10-24T10:49:28.875" v="958" actId="1076"/>
+          <ac:spMkLst>
+            <pc:docMk/>
+            <pc:sldMk cId="4147652325" sldId="266"/>
+            <ac:spMk id="40" creationId="{2FC86174-D624-4032-8C10-2FE196422619}"/>
+          </ac:spMkLst>
+        </pc:spChg>
+        <pc:cxnChg chg="mod">
+          <ac:chgData name="Marco Micera" userId="653d34e43499e34c" providerId="LiveId" clId="{9B4871F7-37E3-4860-B641-C29AE772CF69}" dt="2018-10-24T10:49:36.719" v="959" actId="692"/>
+          <ac:cxnSpMkLst>
+            <pc:docMk/>
+            <pc:sldMk cId="4147652325" sldId="266"/>
+            <ac:cxnSpMk id="31" creationId="{3F5A3AAF-1AB2-459D-8D05-3FFFE89AD50C}"/>
           </ac:cxnSpMkLst>
         </pc:cxnChg>
       </pc:sldChg>
@@ -3817,7 +3840,7 @@
           <a:p>
             <a:fld id="{EBA5C4FE-AC17-4CF0-B05A-029F01855B89}" type="datetimeFigureOut">
               <a:rPr lang="en-US" smtClean="0"/>
-              <a:t>10/24/2018</a:t>
+              <a:t>10/25/2018</a:t>
             </a:fld>
             <a:endParaRPr lang="en-US"/>
           </a:p>
@@ -4231,7 +4254,7 @@
           <a:p>
             <a:fld id="{3D825227-59CF-4F1C-888A-6CDEA0B8E749}" type="datetimeFigureOut">
               <a:rPr lang="en-US" smtClean="0"/>
-              <a:t>10/24/2018</a:t>
+              <a:t>10/25/2018</a:t>
             </a:fld>
             <a:endParaRPr lang="en-US"/>
           </a:p>
@@ -4429,7 +4452,7 @@
           <a:p>
             <a:fld id="{3D825227-59CF-4F1C-888A-6CDEA0B8E749}" type="datetimeFigureOut">
               <a:rPr lang="en-US" smtClean="0"/>
-              <a:t>10/24/2018</a:t>
+              <a:t>10/25/2018</a:t>
             </a:fld>
             <a:endParaRPr lang="en-US"/>
           </a:p>
@@ -4637,7 +4660,7 @@
           <a:p>
             <a:fld id="{3D825227-59CF-4F1C-888A-6CDEA0B8E749}" type="datetimeFigureOut">
               <a:rPr lang="en-US" smtClean="0"/>
-              <a:t>10/24/2018</a:t>
+              <a:t>10/25/2018</a:t>
             </a:fld>
             <a:endParaRPr lang="en-US"/>
           </a:p>
@@ -4840,7 +4863,7 @@
           <a:p>
             <a:fld id="{3D825227-59CF-4F1C-888A-6CDEA0B8E749}" type="datetimeFigureOut">
               <a:rPr lang="en-US" smtClean="0"/>
-              <a:t>10/24/2018</a:t>
+              <a:t>10/25/2018</a:t>
             </a:fld>
             <a:endParaRPr lang="en-US"/>
           </a:p>
@@ -5115,7 +5138,7 @@
           <a:p>
             <a:fld id="{3D825227-59CF-4F1C-888A-6CDEA0B8E749}" type="datetimeFigureOut">
               <a:rPr lang="en-US" smtClean="0"/>
-              <a:t>10/24/2018</a:t>
+              <a:t>10/25/2018</a:t>
             </a:fld>
             <a:endParaRPr lang="en-US"/>
           </a:p>
@@ -5380,7 +5403,7 @@
           <a:p>
             <a:fld id="{3D825227-59CF-4F1C-888A-6CDEA0B8E749}" type="datetimeFigureOut">
               <a:rPr lang="en-US" smtClean="0"/>
-              <a:t>10/24/2018</a:t>
+              <a:t>10/25/2018</a:t>
             </a:fld>
             <a:endParaRPr lang="en-US"/>
           </a:p>
@@ -5792,7 +5815,7 @@
           <a:p>
             <a:fld id="{3D825227-59CF-4F1C-888A-6CDEA0B8E749}" type="datetimeFigureOut">
               <a:rPr lang="en-US" smtClean="0"/>
-              <a:t>10/24/2018</a:t>
+              <a:t>10/25/2018</a:t>
             </a:fld>
             <a:endParaRPr lang="en-US"/>
           </a:p>
@@ -5933,7 +5956,7 @@
           <a:p>
             <a:fld id="{3D825227-59CF-4F1C-888A-6CDEA0B8E749}" type="datetimeFigureOut">
               <a:rPr lang="en-US" smtClean="0"/>
-              <a:t>10/24/2018</a:t>
+              <a:t>10/25/2018</a:t>
             </a:fld>
             <a:endParaRPr lang="en-US"/>
           </a:p>
@@ -6046,7 +6069,7 @@
           <a:p>
             <a:fld id="{3D825227-59CF-4F1C-888A-6CDEA0B8E749}" type="datetimeFigureOut">
               <a:rPr lang="en-US" smtClean="0"/>
-              <a:t>10/24/2018</a:t>
+              <a:t>10/25/2018</a:t>
             </a:fld>
             <a:endParaRPr lang="en-US"/>
           </a:p>
@@ -6357,7 +6380,7 @@
           <a:p>
             <a:fld id="{3D825227-59CF-4F1C-888A-6CDEA0B8E749}" type="datetimeFigureOut">
               <a:rPr lang="en-US" smtClean="0"/>
-              <a:t>10/24/2018</a:t>
+              <a:t>10/25/2018</a:t>
             </a:fld>
             <a:endParaRPr lang="en-US"/>
           </a:p>
@@ -6645,7 +6668,7 @@
           <a:p>
             <a:fld id="{3D825227-59CF-4F1C-888A-6CDEA0B8E749}" type="datetimeFigureOut">
               <a:rPr lang="en-US" smtClean="0"/>
-              <a:t>10/24/2018</a:t>
+              <a:t>10/25/2018</a:t>
             </a:fld>
             <a:endParaRPr lang="en-US"/>
           </a:p>
@@ -6886,7 +6909,7 @@
           <a:p>
             <a:fld id="{3D825227-59CF-4F1C-888A-6CDEA0B8E749}" type="datetimeFigureOut">
               <a:rPr lang="en-US" smtClean="0"/>
-              <a:t>10/24/2018</a:t>
+              <a:t>10/25/2018</a:t>
             </a:fld>
             <a:endParaRPr lang="en-US"/>
           </a:p>
@@ -7379,7 +7402,7 @@
                 <a:latin typeface="Computer Modern"/>
                 <a:cs typeface="Arial" panose="020B0604020202020204" pitchFamily="34" charset="0"/>
               </a:rPr>
-              <a:t>Data producer</a:t>
+              <a:t>Query issuer</a:t>
             </a:r>
           </a:p>
         </p:txBody>
@@ -7527,11 +7550,11 @@
           <a:p>
             <a:pPr algn="ctr"/>
             <a:r>
-              <a:rPr lang="en-US">
+              <a:rPr lang="en-US" dirty="0">
                 <a:latin typeface="Computer Modern"/>
                 <a:cs typeface="Arial" panose="020B0604020202020204" pitchFamily="34" charset="0"/>
               </a:rPr>
-              <a:t>Data consumer</a:t>
+              <a:t>Data owner</a:t>
             </a:r>
           </a:p>
         </p:txBody>
@@ -16347,11 +16370,11 @@
           <a:p>
             <a:pPr algn="ctr"/>
             <a:r>
-              <a:rPr lang="en-US">
+              <a:rPr lang="en-US" dirty="0">
                 <a:latin typeface="Computer Modern"/>
                 <a:cs typeface="Arial" panose="020B0604020202020204" pitchFamily="34" charset="0"/>
               </a:rPr>
-              <a:t>Data producer</a:t>
+              <a:t>Query issuer</a:t>
             </a:r>
           </a:p>
         </p:txBody>
@@ -16499,16 +16522,12 @@
           <a:p>
             <a:pPr algn="ctr"/>
             <a:r>
-              <a:rPr lang="it-IT" dirty="0">
+              <a:rPr lang="en-US" dirty="0">
                 <a:latin typeface="Computer Modern"/>
                 <a:cs typeface="Arial" panose="020B0604020202020204" pitchFamily="34" charset="0"/>
               </a:rPr>
-              <a:t>Data consumer</a:t>
-            </a:r>
-            <a:endParaRPr lang="en-US" dirty="0">
-              <a:latin typeface="Computer Modern"/>
-              <a:cs typeface="Arial" panose="020B0604020202020204" pitchFamily="34" charset="0"/>
-            </a:endParaRPr>
+              <a:t>Data owner</a:t>
+            </a:r>
           </a:p>
         </p:txBody>
       </p:sp>
@@ -17347,11 +17366,11 @@
           <a:p>
             <a:pPr algn="ctr"/>
             <a:r>
-              <a:rPr lang="en-US">
+              <a:rPr lang="en-US" dirty="0">
                 <a:latin typeface="Computer Modern"/>
                 <a:cs typeface="Arial" panose="020B0604020202020204" pitchFamily="34" charset="0"/>
               </a:rPr>
-              <a:t>Data producer</a:t>
+              <a:t>Query issuer</a:t>
             </a:r>
           </a:p>
         </p:txBody>
@@ -17499,16 +17518,12 @@
           <a:p>
             <a:pPr algn="ctr"/>
             <a:r>
-              <a:rPr lang="it-IT" dirty="0">
+              <a:rPr lang="en-US" dirty="0">
                 <a:latin typeface="Computer Modern"/>
                 <a:cs typeface="Arial" panose="020B0604020202020204" pitchFamily="34" charset="0"/>
               </a:rPr>
-              <a:t>Data consumer</a:t>
-            </a:r>
-            <a:endParaRPr lang="en-US" dirty="0">
-              <a:latin typeface="Computer Modern"/>
-              <a:cs typeface="Arial" panose="020B0604020202020204" pitchFamily="34" charset="0"/>
-            </a:endParaRPr>
+              <a:t>Data owner</a:t>
+            </a:r>
           </a:p>
         </p:txBody>
       </p:sp>
@@ -18391,7 +18406,7 @@
         <p:spPr>
           <a:xfrm>
             <a:off x="1528683" y="59850"/>
-            <a:ext cx="9134628" cy="6738300"/>
+            <a:ext cx="9134628" cy="6738299"/>
           </a:xfrm>
           <a:prstGeom prst="rect">
             <a:avLst/>
@@ -19377,7 +19392,7 @@
         </p:nvSpPr>
         <p:spPr>
           <a:xfrm>
-            <a:off x="1228540" y="6160930"/>
+            <a:off x="10095915" y="6160930"/>
             <a:ext cx="867545" cy="523220"/>
           </a:xfrm>
           <a:prstGeom prst="rect">
@@ -19393,6 +19408,11 @@
           <a:p>
             <a:r>
               <a:rPr lang="en-US" sz="2800" dirty="0">
+                <a:solidFill>
+                  <a:schemeClr val="bg1">
+                    <a:lumMod val="65000"/>
+                  </a:schemeClr>
+                </a:solidFill>
                 <a:latin typeface="Computer Modern"/>
                 <a:cs typeface="Arial" panose="020B0604020202020204" pitchFamily="34" charset="0"/>
               </a:rPr>
@@ -19459,15 +19479,15 @@
           </p:cNvPr>
           <p:cNvCxnSpPr>
             <a:cxnSpLocks/>
-            <a:stCxn id="25" idx="4"/>
+            <a:stCxn id="25" idx="3"/>
             <a:endCxn id="4" idx="6"/>
           </p:cNvCxnSpPr>
           <p:nvPr/>
         </p:nvCxnSpPr>
         <p:spPr>
           <a:xfrm rot="5400000">
-            <a:off x="5723177" y="1827277"/>
-            <a:ext cx="1588624" cy="4929045"/>
+            <a:off x="5462800" y="1981373"/>
+            <a:ext cx="1694904" cy="4514572"/>
           </a:xfrm>
           <a:prstGeom prst="curvedConnector2">
             <a:avLst/>
@@ -20052,6 +20072,269 @@
           </a:p>
         </p:txBody>
       </p:sp>
+      <p:sp>
+        <p:nvSpPr>
+          <p:cNvPr id="33" name="Oval 32">
+            <a:extLst>
+              <a:ext uri="{FF2B5EF4-FFF2-40B4-BE49-F238E27FC236}">
+                <a16:creationId xmlns:a16="http://schemas.microsoft.com/office/drawing/2014/main" id="{D0174A62-9F4C-4A1E-A68C-E049A88A17F5}"/>
+              </a:ext>
+            </a:extLst>
+          </p:cNvPr>
+          <p:cNvSpPr/>
+          <p:nvPr/>
+        </p:nvSpPr>
+        <p:spPr>
+          <a:xfrm>
+            <a:off x="8136269" y="4318057"/>
+            <a:ext cx="1691484" cy="1523066"/>
+          </a:xfrm>
+          <a:prstGeom prst="ellipse">
+            <a:avLst/>
+          </a:prstGeom>
+          <a:ln>
+            <a:solidFill>
+              <a:schemeClr val="bg1">
+                <a:lumMod val="65000"/>
+              </a:schemeClr>
+            </a:solidFill>
+          </a:ln>
+        </p:spPr>
+        <p:style>
+          <a:lnRef idx="2">
+            <a:schemeClr val="dk1"/>
+          </a:lnRef>
+          <a:fillRef idx="1">
+            <a:schemeClr val="lt1"/>
+          </a:fillRef>
+          <a:effectRef idx="0">
+            <a:schemeClr val="dk1"/>
+          </a:effectRef>
+          <a:fontRef idx="minor">
+            <a:schemeClr val="dk1"/>
+          </a:fontRef>
+        </p:style>
+        <p:txBody>
+          <a:bodyPr rtlCol="0" anchor="ctr"/>
+          <a:lstStyle/>
+          <a:p>
+            <a:pPr algn="ctr"/>
+            <a:r>
+              <a:rPr lang="en-US" sz="1600" dirty="0">
+                <a:solidFill>
+                  <a:schemeClr val="bg1">
+                    <a:lumMod val="65000"/>
+                  </a:schemeClr>
+                </a:solidFill>
+                <a:latin typeface="Computer Modern"/>
+                <a:cs typeface="Arial" panose="020B0604020202020204" pitchFamily="34" charset="0"/>
+              </a:rPr>
+              <a:t>Another data producer and consumer</a:t>
+            </a:r>
+          </a:p>
+        </p:txBody>
+      </p:sp>
+      <p:sp>
+        <p:nvSpPr>
+          <p:cNvPr id="36" name="Rectangle 35">
+            <a:extLst>
+              <a:ext uri="{FF2B5EF4-FFF2-40B4-BE49-F238E27FC236}">
+                <a16:creationId xmlns:a16="http://schemas.microsoft.com/office/drawing/2014/main" id="{26EB30A9-7A56-46AD-A821-7E2167BE6DF9}"/>
+              </a:ext>
+            </a:extLst>
+          </p:cNvPr>
+          <p:cNvSpPr/>
+          <p:nvPr/>
+        </p:nvSpPr>
+        <p:spPr>
+          <a:xfrm>
+            <a:off x="7983415" y="4140302"/>
+            <a:ext cx="1997192" cy="2429302"/>
+          </a:xfrm>
+          <a:prstGeom prst="rect">
+            <a:avLst/>
+          </a:prstGeom>
+          <a:noFill/>
+          <a:ln w="12700">
+            <a:solidFill>
+              <a:schemeClr val="bg1">
+                <a:lumMod val="65000"/>
+              </a:schemeClr>
+            </a:solidFill>
+            <a:prstDash val="lgDash"/>
+          </a:ln>
+        </p:spPr>
+        <p:style>
+          <a:lnRef idx="2">
+            <a:schemeClr val="dk1"/>
+          </a:lnRef>
+          <a:fillRef idx="1">
+            <a:schemeClr val="lt1"/>
+          </a:fillRef>
+          <a:effectRef idx="0">
+            <a:schemeClr val="dk1"/>
+          </a:effectRef>
+          <a:fontRef idx="minor">
+            <a:schemeClr val="dk1"/>
+          </a:fontRef>
+        </p:style>
+        <p:txBody>
+          <a:bodyPr rtlCol="0" anchor="ctr"/>
+          <a:lstStyle/>
+          <a:p>
+            <a:pPr algn="ctr"/>
+            <a:endParaRPr lang="en-US">
+              <a:solidFill>
+                <a:schemeClr val="bg1">
+                  <a:lumMod val="65000"/>
+                </a:schemeClr>
+              </a:solidFill>
+              <a:latin typeface="Computer Modern"/>
+              <a:cs typeface="Arial" panose="020B0604020202020204" pitchFamily="34" charset="0"/>
+            </a:endParaRPr>
+          </a:p>
+        </p:txBody>
+      </p:sp>
+      <p:sp>
+        <p:nvSpPr>
+          <p:cNvPr id="38" name="TextBox 37">
+            <a:extLst>
+              <a:ext uri="{FF2B5EF4-FFF2-40B4-BE49-F238E27FC236}">
+                <a16:creationId xmlns:a16="http://schemas.microsoft.com/office/drawing/2014/main" id="{824C310F-0541-43BD-8F5D-B06C3279475B}"/>
+              </a:ext>
+            </a:extLst>
+          </p:cNvPr>
+          <p:cNvSpPr txBox="1"/>
+          <p:nvPr/>
+        </p:nvSpPr>
+        <p:spPr>
+          <a:xfrm>
+            <a:off x="1228540" y="6160930"/>
+            <a:ext cx="867545" cy="523220"/>
+          </a:xfrm>
+          <a:prstGeom prst="rect">
+            <a:avLst/>
+          </a:prstGeom>
+          <a:noFill/>
+        </p:spPr>
+        <p:txBody>
+          <a:bodyPr wrap="none" rtlCol="0">
+            <a:spAutoFit/>
+          </a:bodyPr>
+          <a:lstStyle/>
+          <a:p>
+            <a:r>
+              <a:rPr lang="en-US" sz="2800" dirty="0">
+                <a:latin typeface="Computer Modern"/>
+                <a:cs typeface="Arial" panose="020B0604020202020204" pitchFamily="34" charset="0"/>
+              </a:rPr>
+              <a:t>Rack</a:t>
+            </a:r>
+          </a:p>
+        </p:txBody>
+      </p:sp>
+      <p:cxnSp>
+        <p:nvCxnSpPr>
+          <p:cNvPr id="39" name="Straight Arrow Connector 16">
+            <a:extLst>
+              <a:ext uri="{FF2B5EF4-FFF2-40B4-BE49-F238E27FC236}">
+                <a16:creationId xmlns:a16="http://schemas.microsoft.com/office/drawing/2014/main" id="{6C5BF1DC-5306-4289-9E0C-21D47D4B34DD}"/>
+              </a:ext>
+            </a:extLst>
+          </p:cNvPr>
+          <p:cNvCxnSpPr>
+            <a:cxnSpLocks/>
+            <a:stCxn id="25" idx="4"/>
+            <a:endCxn id="33" idx="0"/>
+          </p:cNvCxnSpPr>
+          <p:nvPr/>
+        </p:nvCxnSpPr>
+        <p:spPr>
+          <a:xfrm rot="5400000">
+            <a:off x="8571726" y="3907772"/>
+            <a:ext cx="820570" cy="12700"/>
+          </a:xfrm>
+          <a:prstGeom prst="curvedConnector3">
+            <a:avLst>
+              <a:gd name="adj1" fmla="val 50000"/>
+            </a:avLst>
+          </a:prstGeom>
+          <a:ln w="38100" cap="sq">
+            <a:solidFill>
+              <a:schemeClr val="bg1">
+                <a:lumMod val="65000"/>
+              </a:schemeClr>
+            </a:solidFill>
+            <a:miter lim="800000"/>
+            <a:headEnd type="triangle" w="lg" len="med"/>
+            <a:tailEnd type="triangle" w="lg" len="med"/>
+          </a:ln>
+        </p:spPr>
+        <p:style>
+          <a:lnRef idx="3">
+            <a:schemeClr val="dk1"/>
+          </a:lnRef>
+          <a:fillRef idx="0">
+            <a:schemeClr val="dk1"/>
+          </a:fillRef>
+          <a:effectRef idx="2">
+            <a:schemeClr val="dk1"/>
+          </a:effectRef>
+          <a:fontRef idx="minor">
+            <a:schemeClr val="tx1"/>
+          </a:fontRef>
+        </p:style>
+      </p:cxnSp>
+      <p:cxnSp>
+        <p:nvCxnSpPr>
+          <p:cNvPr id="40" name="Straight Arrow Connector 16">
+            <a:extLst>
+              <a:ext uri="{FF2B5EF4-FFF2-40B4-BE49-F238E27FC236}">
+                <a16:creationId xmlns:a16="http://schemas.microsoft.com/office/drawing/2014/main" id="{6BA37FD2-3C62-4278-99C3-EF87EC0F4FD4}"/>
+              </a:ext>
+            </a:extLst>
+          </p:cNvPr>
+          <p:cNvCxnSpPr>
+            <a:cxnSpLocks/>
+            <a:stCxn id="20" idx="5"/>
+            <a:endCxn id="33" idx="2"/>
+          </p:cNvCxnSpPr>
+          <p:nvPr/>
+        </p:nvCxnSpPr>
+        <p:spPr>
+          <a:xfrm rot="16200000" flipH="1">
+            <a:off x="5031617" y="1974938"/>
+            <a:ext cx="1688382" cy="4520921"/>
+          </a:xfrm>
+          <a:prstGeom prst="curvedConnector2">
+            <a:avLst/>
+          </a:prstGeom>
+          <a:ln w="38100" cap="sq">
+            <a:solidFill>
+              <a:schemeClr val="bg1">
+                <a:lumMod val="65000"/>
+              </a:schemeClr>
+            </a:solidFill>
+            <a:miter lim="800000"/>
+            <a:headEnd type="triangle" w="lg" len="med"/>
+            <a:tailEnd type="none" w="lg" len="med"/>
+          </a:ln>
+        </p:spPr>
+        <p:style>
+          <a:lnRef idx="3">
+            <a:schemeClr val="dk1"/>
+          </a:lnRef>
+          <a:fillRef idx="0">
+            <a:schemeClr val="dk1"/>
+          </a:fillRef>
+          <a:effectRef idx="2">
+            <a:schemeClr val="dk1"/>
+          </a:effectRef>
+          <a:fontRef idx="minor">
+            <a:schemeClr val="tx1"/>
+          </a:fontRef>
+        </p:style>
+      </p:cxnSp>
     </p:spTree>
     <p:extLst>
       <p:ext uri="{BB962C8B-B14F-4D97-AF65-F5344CB8AC3E}">
@@ -20929,6 +21212,68 @@
           </a:fontRef>
         </p:style>
       </p:cxnSp>
+      <p:sp>
+        <p:nvSpPr>
+          <p:cNvPr id="32" name="Oval 31">
+            <a:extLst>
+              <a:ext uri="{FF2B5EF4-FFF2-40B4-BE49-F238E27FC236}">
+                <a16:creationId xmlns:a16="http://schemas.microsoft.com/office/drawing/2014/main" id="{EC03A17D-894C-4806-AF96-107663CEBDD8}"/>
+              </a:ext>
+            </a:extLst>
+          </p:cNvPr>
+          <p:cNvSpPr/>
+          <p:nvPr/>
+        </p:nvSpPr>
+        <p:spPr>
+          <a:xfrm>
+            <a:off x="8136269" y="4318057"/>
+            <a:ext cx="1691484" cy="1523066"/>
+          </a:xfrm>
+          <a:prstGeom prst="ellipse">
+            <a:avLst/>
+          </a:prstGeom>
+          <a:ln>
+            <a:solidFill>
+              <a:schemeClr val="bg1">
+                <a:lumMod val="65000"/>
+              </a:schemeClr>
+            </a:solidFill>
+          </a:ln>
+        </p:spPr>
+        <p:style>
+          <a:lnRef idx="2">
+            <a:schemeClr val="dk1"/>
+          </a:lnRef>
+          <a:fillRef idx="1">
+            <a:schemeClr val="lt1"/>
+          </a:fillRef>
+          <a:effectRef idx="0">
+            <a:schemeClr val="dk1"/>
+          </a:effectRef>
+          <a:fontRef idx="minor">
+            <a:schemeClr val="dk1"/>
+          </a:fontRef>
+        </p:style>
+        <p:txBody>
+          <a:bodyPr rtlCol="0" anchor="ctr"/>
+          <a:lstStyle/>
+          <a:p>
+            <a:pPr algn="ctr"/>
+            <a:r>
+              <a:rPr lang="en-US" sz="1600" dirty="0">
+                <a:solidFill>
+                  <a:schemeClr val="bg1">
+                    <a:lumMod val="65000"/>
+                  </a:schemeClr>
+                </a:solidFill>
+                <a:latin typeface="Computer Modern"/>
+                <a:cs typeface="Arial" panose="020B0604020202020204" pitchFamily="34" charset="0"/>
+              </a:rPr>
+              <a:t>Another data producer and consumer</a:t>
+            </a:r>
+          </a:p>
+        </p:txBody>
+      </p:sp>
       <p:cxnSp>
         <p:nvCxnSpPr>
           <p:cNvPr id="50" name="Straight Arrow Connector 16">
@@ -20940,20 +21285,17 @@
           </p:cNvPr>
           <p:cNvCxnSpPr>
             <a:cxnSpLocks/>
-            <a:stCxn id="4" idx="5"/>
             <a:endCxn id="25" idx="5"/>
           </p:cNvCxnSpPr>
           <p:nvPr/>
         </p:nvCxnSpPr>
         <p:spPr>
-          <a:xfrm rot="5400000" flipH="1" flipV="1">
-            <a:off x="5484174" y="1712287"/>
-            <a:ext cx="2233389" cy="5591230"/>
-          </a:xfrm>
-          <a:prstGeom prst="curvedConnector3">
-            <a:avLst>
-              <a:gd name="adj1" fmla="val -10145"/>
-            </a:avLst>
+          <a:xfrm flipV="1">
+            <a:off x="4052968" y="3391207"/>
+            <a:ext cx="5343516" cy="1971208"/>
+          </a:xfrm>
+          <a:prstGeom prst="curvedConnector2">
+            <a:avLst/>
           </a:prstGeom>
           <a:ln w="38100" cap="sq">
             <a:solidFill>
@@ -20981,6 +21323,210 @@
       </p:cxnSp>
       <p:sp>
         <p:nvSpPr>
+          <p:cNvPr id="24" name="TextBox 23">
+            <a:extLst>
+              <a:ext uri="{FF2B5EF4-FFF2-40B4-BE49-F238E27FC236}">
+                <a16:creationId xmlns:a16="http://schemas.microsoft.com/office/drawing/2014/main" id="{4C7CCA41-3B99-4D6E-B846-D4E3EE0A64E7}"/>
+              </a:ext>
+            </a:extLst>
+          </p:cNvPr>
+          <p:cNvSpPr txBox="1"/>
+          <p:nvPr/>
+        </p:nvSpPr>
+        <p:spPr>
+          <a:xfrm>
+            <a:off x="10095915" y="6160930"/>
+            <a:ext cx="867545" cy="523220"/>
+          </a:xfrm>
+          <a:prstGeom prst="rect">
+            <a:avLst/>
+          </a:prstGeom>
+          <a:noFill/>
+        </p:spPr>
+        <p:txBody>
+          <a:bodyPr wrap="none" rtlCol="0">
+            <a:spAutoFit/>
+          </a:bodyPr>
+          <a:lstStyle/>
+          <a:p>
+            <a:r>
+              <a:rPr lang="en-US" sz="2800" dirty="0">
+                <a:solidFill>
+                  <a:schemeClr val="bg1">
+                    <a:lumMod val="65000"/>
+                  </a:schemeClr>
+                </a:solidFill>
+                <a:latin typeface="Computer Modern"/>
+                <a:cs typeface="Arial" panose="020B0604020202020204" pitchFamily="34" charset="0"/>
+              </a:rPr>
+              <a:t>Rack</a:t>
+            </a:r>
+          </a:p>
+        </p:txBody>
+      </p:sp>
+      <p:sp>
+        <p:nvSpPr>
+          <p:cNvPr id="33" name="Rectangle 32">
+            <a:extLst>
+              <a:ext uri="{FF2B5EF4-FFF2-40B4-BE49-F238E27FC236}">
+                <a16:creationId xmlns:a16="http://schemas.microsoft.com/office/drawing/2014/main" id="{2ECF2729-DD95-4CDC-8EEC-8AE3179B1FE0}"/>
+              </a:ext>
+            </a:extLst>
+          </p:cNvPr>
+          <p:cNvSpPr/>
+          <p:nvPr/>
+        </p:nvSpPr>
+        <p:spPr>
+          <a:xfrm>
+            <a:off x="7983415" y="4140302"/>
+            <a:ext cx="1997192" cy="2429302"/>
+          </a:xfrm>
+          <a:prstGeom prst="rect">
+            <a:avLst/>
+          </a:prstGeom>
+          <a:noFill/>
+          <a:ln w="12700">
+            <a:solidFill>
+              <a:schemeClr val="bg1">
+                <a:lumMod val="65000"/>
+              </a:schemeClr>
+            </a:solidFill>
+            <a:prstDash val="lgDash"/>
+          </a:ln>
+        </p:spPr>
+        <p:style>
+          <a:lnRef idx="2">
+            <a:schemeClr val="dk1"/>
+          </a:lnRef>
+          <a:fillRef idx="1">
+            <a:schemeClr val="lt1"/>
+          </a:fillRef>
+          <a:effectRef idx="0">
+            <a:schemeClr val="dk1"/>
+          </a:effectRef>
+          <a:fontRef idx="minor">
+            <a:schemeClr val="dk1"/>
+          </a:fontRef>
+        </p:style>
+        <p:txBody>
+          <a:bodyPr rtlCol="0" anchor="ctr"/>
+          <a:lstStyle/>
+          <a:p>
+            <a:pPr algn="ctr"/>
+            <a:endParaRPr lang="en-US">
+              <a:solidFill>
+                <a:schemeClr val="bg1">
+                  <a:lumMod val="65000"/>
+                </a:schemeClr>
+              </a:solidFill>
+              <a:latin typeface="Computer Modern"/>
+              <a:cs typeface="Arial" panose="020B0604020202020204" pitchFamily="34" charset="0"/>
+            </a:endParaRPr>
+          </a:p>
+        </p:txBody>
+      </p:sp>
+      <p:cxnSp>
+        <p:nvCxnSpPr>
+          <p:cNvPr id="35" name="Straight Arrow Connector 16">
+            <a:extLst>
+              <a:ext uri="{FF2B5EF4-FFF2-40B4-BE49-F238E27FC236}">
+                <a16:creationId xmlns:a16="http://schemas.microsoft.com/office/drawing/2014/main" id="{D9C9F293-00D4-4F22-98C1-AA6F3838583D}"/>
+              </a:ext>
+            </a:extLst>
+          </p:cNvPr>
+          <p:cNvCxnSpPr>
+            <a:cxnSpLocks/>
+            <a:endCxn id="32" idx="0"/>
+          </p:cNvCxnSpPr>
+          <p:nvPr/>
+        </p:nvCxnSpPr>
+        <p:spPr>
+          <a:xfrm rot="5400000">
+            <a:off x="8571726" y="3907772"/>
+            <a:ext cx="820570" cy="12700"/>
+          </a:xfrm>
+          <a:prstGeom prst="curvedConnector3">
+            <a:avLst>
+              <a:gd name="adj1" fmla="val 50000"/>
+            </a:avLst>
+          </a:prstGeom>
+          <a:ln w="38100" cap="sq">
+            <a:solidFill>
+              <a:schemeClr val="bg1">
+                <a:lumMod val="65000"/>
+              </a:schemeClr>
+            </a:solidFill>
+            <a:miter lim="800000"/>
+            <a:headEnd type="triangle" w="lg" len="med"/>
+            <a:tailEnd type="triangle" w="lg" len="med"/>
+          </a:ln>
+        </p:spPr>
+        <p:style>
+          <a:lnRef idx="3">
+            <a:schemeClr val="dk1"/>
+          </a:lnRef>
+          <a:fillRef idx="0">
+            <a:schemeClr val="dk1"/>
+          </a:fillRef>
+          <a:effectRef idx="2">
+            <a:schemeClr val="dk1"/>
+          </a:effectRef>
+          <a:fontRef idx="minor">
+            <a:schemeClr val="tx1"/>
+          </a:fontRef>
+        </p:style>
+      </p:cxnSp>
+      <p:cxnSp>
+        <p:nvCxnSpPr>
+          <p:cNvPr id="37" name="Straight Arrow Connector 16">
+            <a:extLst>
+              <a:ext uri="{FF2B5EF4-FFF2-40B4-BE49-F238E27FC236}">
+                <a16:creationId xmlns:a16="http://schemas.microsoft.com/office/drawing/2014/main" id="{57EB43AD-B42F-421D-AE96-A3AF9BD271E6}"/>
+              </a:ext>
+            </a:extLst>
+          </p:cNvPr>
+          <p:cNvCxnSpPr>
+            <a:cxnSpLocks/>
+            <a:endCxn id="32" idx="2"/>
+          </p:cNvCxnSpPr>
+          <p:nvPr/>
+        </p:nvCxnSpPr>
+        <p:spPr>
+          <a:xfrm rot="16200000" flipH="1">
+            <a:off x="5031617" y="1974938"/>
+            <a:ext cx="1688382" cy="4520921"/>
+          </a:xfrm>
+          <a:prstGeom prst="curvedConnector2">
+            <a:avLst/>
+          </a:prstGeom>
+          <a:ln w="38100" cap="sq">
+            <a:solidFill>
+              <a:schemeClr val="bg1">
+                <a:lumMod val="65000"/>
+              </a:schemeClr>
+            </a:solidFill>
+            <a:miter lim="800000"/>
+            <a:headEnd type="triangle" w="lg" len="med"/>
+            <a:tailEnd type="none" w="lg" len="med"/>
+          </a:ln>
+        </p:spPr>
+        <p:style>
+          <a:lnRef idx="3">
+            <a:schemeClr val="dk1"/>
+          </a:lnRef>
+          <a:fillRef idx="0">
+            <a:schemeClr val="dk1"/>
+          </a:fillRef>
+          <a:effectRef idx="2">
+            <a:schemeClr val="dk1"/>
+          </a:effectRef>
+          <a:fontRef idx="minor">
+            <a:schemeClr val="tx1"/>
+          </a:fontRef>
+        </p:style>
+      </p:cxnSp>
+      <p:sp>
+        <p:nvSpPr>
           <p:cNvPr id="51" name="Rectangle 50">
             <a:extLst>
               <a:ext uri="{FF2B5EF4-FFF2-40B4-BE49-F238E27FC236}">
@@ -20993,7 +21539,7 @@
         </p:nvSpPr>
         <p:spPr>
           <a:xfrm>
-            <a:off x="8660607" y="5234849"/>
+            <a:off x="4493553" y="5461786"/>
             <a:ext cx="2693193" cy="369332"/>
           </a:xfrm>
           <a:prstGeom prst="rect">
@@ -21584,7 +22130,7 @@
             <a:avLst/>
           </a:prstGeom>
           <a:ln w="38100" cap="sq">
-            <a:prstDash val="sysDot"/>
+            <a:prstDash val="solid"/>
             <a:miter lim="800000"/>
             <a:headEnd type="none" w="lg" len="med"/>
             <a:tailEnd type="triangle" w="lg" len="med"/>

</xml_diff>

<commit_message>
RMs scheduler architectures, updated INP common patterns and aspects of interests to RMs
</commit_message>
<xml_diff>
--- a/doc/thesis/figures/analysis/inp/presentation.pptx
+++ b/doc/thesis/figures/analysis/inp/presentation.pptx
@@ -2268,101 +2268,6 @@
     </pc:docChg>
   </pc:docChgLst>
   <pc:docChgLst>
-    <pc:chgData name="Marco Micera" userId="653d34e43499e34c" providerId="LiveId" clId="{3E18B0EE-3304-4FA8-85B7-01C6FB6BA8AC}"/>
-    <pc:docChg chg="custSel addSld modSld">
-      <pc:chgData name="Marco Micera" userId="653d34e43499e34c" providerId="LiveId" clId="{3E18B0EE-3304-4FA8-85B7-01C6FB6BA8AC}" dt="2018-10-19T15:45:58.856" v="185" actId="1076"/>
-      <pc:docMkLst>
-        <pc:docMk/>
-      </pc:docMkLst>
-      <pc:sldChg chg="modSp">
-        <pc:chgData name="Marco Micera" userId="653d34e43499e34c" providerId="LiveId" clId="{3E18B0EE-3304-4FA8-85B7-01C6FB6BA8AC}" dt="2018-10-19T15:25:28.131" v="14" actId="692"/>
-        <pc:sldMkLst>
-          <pc:docMk/>
-          <pc:sldMk cId="3636622696" sldId="259"/>
-        </pc:sldMkLst>
-        <pc:spChg chg="mod">
-          <ac:chgData name="Marco Micera" userId="653d34e43499e34c" providerId="LiveId" clId="{3E18B0EE-3304-4FA8-85B7-01C6FB6BA8AC}" dt="2018-10-19T15:25:28.131" v="14" actId="692"/>
-          <ac:spMkLst>
-            <pc:docMk/>
-            <pc:sldMk cId="3636622696" sldId="259"/>
-            <ac:spMk id="31" creationId="{D443ED90-7BCA-41CC-9C13-E4728ECA847A}"/>
-          </ac:spMkLst>
-        </pc:spChg>
-        <pc:spChg chg="mod">
-          <ac:chgData name="Marco Micera" userId="653d34e43499e34c" providerId="LiveId" clId="{3E18B0EE-3304-4FA8-85B7-01C6FB6BA8AC}" dt="2018-10-19T15:25:24.253" v="13" actId="207"/>
-          <ac:spMkLst>
-            <pc:docMk/>
-            <pc:sldMk cId="3636622696" sldId="259"/>
-            <ac:spMk id="37" creationId="{53F49961-5E10-4C29-A246-C93FB9B7714E}"/>
-          </ac:spMkLst>
-        </pc:spChg>
-      </pc:sldChg>
-      <pc:sldChg chg="addSp delSp modSp add">
-        <pc:chgData name="Marco Micera" userId="653d34e43499e34c" providerId="LiveId" clId="{3E18B0EE-3304-4FA8-85B7-01C6FB6BA8AC}" dt="2018-10-19T15:45:58.856" v="185" actId="1076"/>
-        <pc:sldMkLst>
-          <pc:docMk/>
-          <pc:sldMk cId="285708299" sldId="260"/>
-        </pc:sldMkLst>
-        <pc:spChg chg="mod">
-          <ac:chgData name="Marco Micera" userId="653d34e43499e34c" providerId="LiveId" clId="{3E18B0EE-3304-4FA8-85B7-01C6FB6BA8AC}" dt="2018-10-19T15:41:58.071" v="48" actId="20577"/>
-          <ac:spMkLst>
-            <pc:docMk/>
-            <pc:sldMk cId="285708299" sldId="260"/>
-            <ac:spMk id="2" creationId="{9B849322-5F50-4096-980C-BF997A02A107}"/>
-          </ac:spMkLst>
-        </pc:spChg>
-        <pc:spChg chg="add mod">
-          <ac:chgData name="Marco Micera" userId="653d34e43499e34c" providerId="LiveId" clId="{3E18B0EE-3304-4FA8-85B7-01C6FB6BA8AC}" dt="2018-10-19T15:44:04.521" v="121" actId="1076"/>
-          <ac:spMkLst>
-            <pc:docMk/>
-            <pc:sldMk cId="285708299" sldId="260"/>
-            <ac:spMk id="25" creationId="{70E73D51-4CE7-401E-928C-81434DFCCECA}"/>
-          </ac:spMkLst>
-        </pc:spChg>
-        <pc:spChg chg="del">
-          <ac:chgData name="Marco Micera" userId="653d34e43499e34c" providerId="LiveId" clId="{3E18B0EE-3304-4FA8-85B7-01C6FB6BA8AC}" dt="2018-10-19T15:42:02.252" v="49" actId="478"/>
-          <ac:spMkLst>
-            <pc:docMk/>
-            <pc:sldMk cId="285708299" sldId="260"/>
-            <ac:spMk id="31" creationId="{D443ED90-7BCA-41CC-9C13-E4728ECA847A}"/>
-          </ac:spMkLst>
-        </pc:spChg>
-        <pc:spChg chg="del">
-          <ac:chgData name="Marco Micera" userId="653d34e43499e34c" providerId="LiveId" clId="{3E18B0EE-3304-4FA8-85B7-01C6FB6BA8AC}" dt="2018-10-19T15:42:03.729" v="50" actId="478"/>
-          <ac:spMkLst>
-            <pc:docMk/>
-            <pc:sldMk cId="285708299" sldId="260"/>
-            <ac:spMk id="37" creationId="{53F49961-5E10-4C29-A246-C93FB9B7714E}"/>
-          </ac:spMkLst>
-        </pc:spChg>
-        <pc:spChg chg="add mod">
-          <ac:chgData name="Marco Micera" userId="653d34e43499e34c" providerId="LiveId" clId="{3E18B0EE-3304-4FA8-85B7-01C6FB6BA8AC}" dt="2018-10-19T15:45:58.856" v="185" actId="1076"/>
-          <ac:spMkLst>
-            <pc:docMk/>
-            <pc:sldMk cId="285708299" sldId="260"/>
-            <ac:spMk id="38" creationId="{2E298FD3-467B-439F-8460-DB1439A7D6B5}"/>
-          </ac:spMkLst>
-        </pc:spChg>
-        <pc:cxnChg chg="add mod">
-          <ac:chgData name="Marco Micera" userId="653d34e43499e34c" providerId="LiveId" clId="{3E18B0EE-3304-4FA8-85B7-01C6FB6BA8AC}" dt="2018-10-19T15:43:58.463" v="120" actId="14100"/>
-          <ac:cxnSpMkLst>
-            <pc:docMk/>
-            <pc:sldMk cId="285708299" sldId="260"/>
-            <ac:cxnSpMk id="23" creationId="{0E3E7868-A7F4-4DBF-AC1B-D43DD34B98A6}"/>
-          </ac:cxnSpMkLst>
-        </pc:cxnChg>
-        <pc:cxnChg chg="add mod">
-          <ac:chgData name="Marco Micera" userId="653d34e43499e34c" providerId="LiveId" clId="{3E18B0EE-3304-4FA8-85B7-01C6FB6BA8AC}" dt="2018-10-19T15:45:52.541" v="184" actId="14100"/>
-          <ac:cxnSpMkLst>
-            <pc:docMk/>
-            <pc:sldMk cId="285708299" sldId="260"/>
-            <ac:cxnSpMk id="35" creationId="{65A0BC18-302F-4F73-901B-03B7E3F353B9}"/>
-          </ac:cxnSpMkLst>
-        </pc:cxnChg>
-      </pc:sldChg>
-    </pc:docChg>
-  </pc:docChgLst>
-  <pc:docChgLst>
     <pc:chgData name="Marco Micera" userId="653d34e43499e34c" providerId="LiveId" clId="{E24A04FD-7C8B-404B-A8AD-965821F6DA8E}"/>
     <pc:docChg chg="undo custSel addSld delSld modSld modMainMaster">
       <pc:chgData name="Marco Micera" userId="653d34e43499e34c" providerId="LiveId" clId="{E24A04FD-7C8B-404B-A8AD-965821F6DA8E}" dt="2018-10-19T14:30:44.710" v="839" actId="692"/>
@@ -2706,24 +2611,135 @@
     </pc:docChg>
   </pc:docChgLst>
   <pc:docChgLst>
-    <pc:chgData name="Marco Micera" userId="653d34e43499e34c" providerId="LiveId" clId="{9B4871F7-37E3-4860-B641-C29AE772CF69}"/>
-    <pc:docChg chg="undo redo custSel addSld modSld">
-      <pc:chgData name="Marco Micera" userId="653d34e43499e34c" providerId="LiveId" clId="{9B4871F7-37E3-4860-B641-C29AE772CF69}" dt="2018-10-24T10:49:36.719" v="959" actId="692"/>
+    <pc:chgData name="Marco Micera" userId="653d34e43499e34c" providerId="LiveId" clId="{3E18B0EE-3304-4FA8-85B7-01C6FB6BA8AC}"/>
+    <pc:docChg chg="custSel addSld modSld">
+      <pc:chgData name="Marco Micera" userId="653d34e43499e34c" providerId="LiveId" clId="{3E18B0EE-3304-4FA8-85B7-01C6FB6BA8AC}" dt="2018-10-19T15:45:58.856" v="185" actId="1076"/>
       <pc:docMkLst>
         <pc:docMk/>
       </pc:docMkLst>
       <pc:sldChg chg="modSp">
-        <pc:chgData name="Marco Micera" userId="653d34e43499e34c" providerId="LiveId" clId="{9B4871F7-37E3-4860-B641-C29AE772CF69}" dt="2018-10-23T22:54:50.976" v="676" actId="692"/>
+        <pc:chgData name="Marco Micera" userId="653d34e43499e34c" providerId="LiveId" clId="{3E18B0EE-3304-4FA8-85B7-01C6FB6BA8AC}" dt="2018-10-19T15:25:28.131" v="14" actId="692"/>
+        <pc:sldMkLst>
+          <pc:docMk/>
+          <pc:sldMk cId="3636622696" sldId="259"/>
+        </pc:sldMkLst>
+        <pc:spChg chg="mod">
+          <ac:chgData name="Marco Micera" userId="653d34e43499e34c" providerId="LiveId" clId="{3E18B0EE-3304-4FA8-85B7-01C6FB6BA8AC}" dt="2018-10-19T15:25:28.131" v="14" actId="692"/>
+          <ac:spMkLst>
+            <pc:docMk/>
+            <pc:sldMk cId="3636622696" sldId="259"/>
+            <ac:spMk id="31" creationId="{D443ED90-7BCA-41CC-9C13-E4728ECA847A}"/>
+          </ac:spMkLst>
+        </pc:spChg>
+        <pc:spChg chg="mod">
+          <ac:chgData name="Marco Micera" userId="653d34e43499e34c" providerId="LiveId" clId="{3E18B0EE-3304-4FA8-85B7-01C6FB6BA8AC}" dt="2018-10-19T15:25:24.253" v="13" actId="207"/>
+          <ac:spMkLst>
+            <pc:docMk/>
+            <pc:sldMk cId="3636622696" sldId="259"/>
+            <ac:spMk id="37" creationId="{53F49961-5E10-4C29-A246-C93FB9B7714E}"/>
+          </ac:spMkLst>
+        </pc:spChg>
+      </pc:sldChg>
+      <pc:sldChg chg="addSp delSp modSp add">
+        <pc:chgData name="Marco Micera" userId="653d34e43499e34c" providerId="LiveId" clId="{3E18B0EE-3304-4FA8-85B7-01C6FB6BA8AC}" dt="2018-10-19T15:45:58.856" v="185" actId="1076"/>
+        <pc:sldMkLst>
+          <pc:docMk/>
+          <pc:sldMk cId="285708299" sldId="260"/>
+        </pc:sldMkLst>
+        <pc:spChg chg="mod">
+          <ac:chgData name="Marco Micera" userId="653d34e43499e34c" providerId="LiveId" clId="{3E18B0EE-3304-4FA8-85B7-01C6FB6BA8AC}" dt="2018-10-19T15:41:58.071" v="48" actId="20577"/>
+          <ac:spMkLst>
+            <pc:docMk/>
+            <pc:sldMk cId="285708299" sldId="260"/>
+            <ac:spMk id="2" creationId="{9B849322-5F50-4096-980C-BF997A02A107}"/>
+          </ac:spMkLst>
+        </pc:spChg>
+        <pc:spChg chg="add mod">
+          <ac:chgData name="Marco Micera" userId="653d34e43499e34c" providerId="LiveId" clId="{3E18B0EE-3304-4FA8-85B7-01C6FB6BA8AC}" dt="2018-10-19T15:44:04.521" v="121" actId="1076"/>
+          <ac:spMkLst>
+            <pc:docMk/>
+            <pc:sldMk cId="285708299" sldId="260"/>
+            <ac:spMk id="25" creationId="{70E73D51-4CE7-401E-928C-81434DFCCECA}"/>
+          </ac:spMkLst>
+        </pc:spChg>
+        <pc:spChg chg="del">
+          <ac:chgData name="Marco Micera" userId="653d34e43499e34c" providerId="LiveId" clId="{3E18B0EE-3304-4FA8-85B7-01C6FB6BA8AC}" dt="2018-10-19T15:42:02.252" v="49" actId="478"/>
+          <ac:spMkLst>
+            <pc:docMk/>
+            <pc:sldMk cId="285708299" sldId="260"/>
+            <ac:spMk id="31" creationId="{D443ED90-7BCA-41CC-9C13-E4728ECA847A}"/>
+          </ac:spMkLst>
+        </pc:spChg>
+        <pc:spChg chg="del">
+          <ac:chgData name="Marco Micera" userId="653d34e43499e34c" providerId="LiveId" clId="{3E18B0EE-3304-4FA8-85B7-01C6FB6BA8AC}" dt="2018-10-19T15:42:03.729" v="50" actId="478"/>
+          <ac:spMkLst>
+            <pc:docMk/>
+            <pc:sldMk cId="285708299" sldId="260"/>
+            <ac:spMk id="37" creationId="{53F49961-5E10-4C29-A246-C93FB9B7714E}"/>
+          </ac:spMkLst>
+        </pc:spChg>
+        <pc:spChg chg="add mod">
+          <ac:chgData name="Marco Micera" userId="653d34e43499e34c" providerId="LiveId" clId="{3E18B0EE-3304-4FA8-85B7-01C6FB6BA8AC}" dt="2018-10-19T15:45:58.856" v="185" actId="1076"/>
+          <ac:spMkLst>
+            <pc:docMk/>
+            <pc:sldMk cId="285708299" sldId="260"/>
+            <ac:spMk id="38" creationId="{2E298FD3-467B-439F-8460-DB1439A7D6B5}"/>
+          </ac:spMkLst>
+        </pc:spChg>
+        <pc:cxnChg chg="add mod">
+          <ac:chgData name="Marco Micera" userId="653d34e43499e34c" providerId="LiveId" clId="{3E18B0EE-3304-4FA8-85B7-01C6FB6BA8AC}" dt="2018-10-19T15:43:58.463" v="120" actId="14100"/>
+          <ac:cxnSpMkLst>
+            <pc:docMk/>
+            <pc:sldMk cId="285708299" sldId="260"/>
+            <ac:cxnSpMk id="23" creationId="{0E3E7868-A7F4-4DBF-AC1B-D43DD34B98A6}"/>
+          </ac:cxnSpMkLst>
+        </pc:cxnChg>
+        <pc:cxnChg chg="add mod">
+          <ac:chgData name="Marco Micera" userId="653d34e43499e34c" providerId="LiveId" clId="{3E18B0EE-3304-4FA8-85B7-01C6FB6BA8AC}" dt="2018-10-19T15:45:52.541" v="184" actId="14100"/>
+          <ac:cxnSpMkLst>
+            <pc:docMk/>
+            <pc:sldMk cId="285708299" sldId="260"/>
+            <ac:cxnSpMk id="35" creationId="{65A0BC18-302F-4F73-901B-03B7E3F353B9}"/>
+          </ac:cxnSpMkLst>
+        </pc:cxnChg>
+      </pc:sldChg>
+    </pc:docChg>
+  </pc:docChgLst>
+  <pc:docChgLst>
+    <pc:chgData name="Marco Micera" userId="653d34e43499e34c" providerId="LiveId" clId="{9B4871F7-37E3-4860-B641-C29AE772CF69}"/>
+    <pc:docChg chg="undo redo custSel addSld modSld">
+      <pc:chgData name="Marco Micera" userId="653d34e43499e34c" providerId="LiveId" clId="{9B4871F7-37E3-4860-B641-C29AE772CF69}" dt="2018-10-30T22:01:42.330" v="961" actId="166"/>
+      <pc:docMkLst>
+        <pc:docMk/>
+      </pc:docMkLst>
+      <pc:sldChg chg="modSp">
+        <pc:chgData name="Marco Micera" userId="653d34e43499e34c" providerId="LiveId" clId="{9B4871F7-37E3-4860-B641-C29AE772CF69}" dt="2018-10-30T22:01:42.330" v="961" actId="166"/>
         <pc:sldMkLst>
           <pc:docMk/>
           <pc:sldMk cId="1899555995" sldId="265"/>
         </pc:sldMkLst>
+        <pc:spChg chg="ord">
+          <ac:chgData name="Marco Micera" userId="653d34e43499e34c" providerId="LiveId" clId="{9B4871F7-37E3-4860-B641-C29AE772CF69}" dt="2018-10-30T22:01:42.330" v="961" actId="166"/>
+          <ac:spMkLst>
+            <pc:docMk/>
+            <pc:sldMk cId="1899555995" sldId="265"/>
+            <ac:spMk id="38" creationId="{F6FD4A65-CCD6-41B7-A41B-9C7C91D7FDD5}"/>
+          </ac:spMkLst>
+        </pc:spChg>
         <pc:cxnChg chg="mod">
           <ac:chgData name="Marco Micera" userId="653d34e43499e34c" providerId="LiveId" clId="{9B4871F7-37E3-4860-B641-C29AE772CF69}" dt="2018-10-23T22:54:50.976" v="676" actId="692"/>
           <ac:cxnSpMkLst>
             <pc:docMk/>
             <pc:sldMk cId="1899555995" sldId="265"/>
             <ac:cxnSpMk id="23" creationId="{B235A176-36C1-4370-B0AF-8091B0CAFA81}"/>
+          </ac:cxnSpMkLst>
+        </pc:cxnChg>
+        <pc:cxnChg chg="ord">
+          <ac:chgData name="Marco Micera" userId="653d34e43499e34c" providerId="LiveId" clId="{9B4871F7-37E3-4860-B641-C29AE772CF69}" dt="2018-10-30T22:01:42.330" v="961" actId="166"/>
+          <ac:cxnSpMkLst>
+            <pc:docMk/>
+            <pc:sldMk cId="1899555995" sldId="265"/>
+            <ac:cxnSpMk id="28" creationId="{E1CD74DF-9709-44FF-82FB-BF08B3FA66DB}"/>
           </ac:cxnSpMkLst>
         </pc:cxnChg>
         <pc:cxnChg chg="mod">
@@ -2734,12 +2750,36 @@
             <ac:cxnSpMk id="29" creationId="{3D950093-1623-4D91-A985-8127869CF43F}"/>
           </ac:cxnSpMkLst>
         </pc:cxnChg>
+        <pc:cxnChg chg="ord">
+          <ac:chgData name="Marco Micera" userId="653d34e43499e34c" providerId="LiveId" clId="{9B4871F7-37E3-4860-B641-C29AE772CF69}" dt="2018-10-30T22:01:42.330" v="961" actId="166"/>
+          <ac:cxnSpMkLst>
+            <pc:docMk/>
+            <pc:sldMk cId="1899555995" sldId="265"/>
+            <ac:cxnSpMk id="30" creationId="{05C56F41-48DC-46BB-BE20-2C405AB77A73}"/>
+          </ac:cxnSpMkLst>
+        </pc:cxnChg>
         <pc:cxnChg chg="mod">
           <ac:chgData name="Marco Micera" userId="653d34e43499e34c" providerId="LiveId" clId="{9B4871F7-37E3-4860-B641-C29AE772CF69}" dt="2018-10-23T22:54:50.976" v="676" actId="692"/>
           <ac:cxnSpMkLst>
             <pc:docMk/>
             <pc:sldMk cId="1899555995" sldId="265"/>
             <ac:cxnSpMk id="31" creationId="{EDCCA11F-6ECE-4B88-9D74-7ED19E204253}"/>
+          </ac:cxnSpMkLst>
+        </pc:cxnChg>
+        <pc:cxnChg chg="ord">
+          <ac:chgData name="Marco Micera" userId="653d34e43499e34c" providerId="LiveId" clId="{9B4871F7-37E3-4860-B641-C29AE772CF69}" dt="2018-10-30T22:01:42.330" v="961" actId="166"/>
+          <ac:cxnSpMkLst>
+            <pc:docMk/>
+            <pc:sldMk cId="1899555995" sldId="265"/>
+            <ac:cxnSpMk id="36" creationId="{887E1878-1850-4632-B8BB-CC6D6A0102A3}"/>
+          </ac:cxnSpMkLst>
+        </pc:cxnChg>
+        <pc:cxnChg chg="ord">
+          <ac:chgData name="Marco Micera" userId="653d34e43499e34c" providerId="LiveId" clId="{9B4871F7-37E3-4860-B641-C29AE772CF69}" dt="2018-10-30T22:01:42.330" v="961" actId="166"/>
+          <ac:cxnSpMkLst>
+            <pc:docMk/>
+            <pc:sldMk cId="1899555995" sldId="265"/>
+            <ac:cxnSpMk id="50" creationId="{C8339DFD-6149-493F-AC39-C8FCB660BA7A}"/>
           </ac:cxnSpMkLst>
         </pc:cxnChg>
       </pc:sldChg>
@@ -3840,7 +3880,7 @@
           <a:p>
             <a:fld id="{EBA5C4FE-AC17-4CF0-B05A-029F01855B89}" type="datetimeFigureOut">
               <a:rPr lang="en-US" smtClean="0"/>
-              <a:t>10/25/2018</a:t>
+              <a:t>10/30/2018</a:t>
             </a:fld>
             <a:endParaRPr lang="en-US"/>
           </a:p>
@@ -4254,7 +4294,7 @@
           <a:p>
             <a:fld id="{3D825227-59CF-4F1C-888A-6CDEA0B8E749}" type="datetimeFigureOut">
               <a:rPr lang="en-US" smtClean="0"/>
-              <a:t>10/25/2018</a:t>
+              <a:t>10/30/2018</a:t>
             </a:fld>
             <a:endParaRPr lang="en-US"/>
           </a:p>
@@ -4452,7 +4492,7 @@
           <a:p>
             <a:fld id="{3D825227-59CF-4F1C-888A-6CDEA0B8E749}" type="datetimeFigureOut">
               <a:rPr lang="en-US" smtClean="0"/>
-              <a:t>10/25/2018</a:t>
+              <a:t>10/30/2018</a:t>
             </a:fld>
             <a:endParaRPr lang="en-US"/>
           </a:p>
@@ -4660,7 +4700,7 @@
           <a:p>
             <a:fld id="{3D825227-59CF-4F1C-888A-6CDEA0B8E749}" type="datetimeFigureOut">
               <a:rPr lang="en-US" smtClean="0"/>
-              <a:t>10/25/2018</a:t>
+              <a:t>10/30/2018</a:t>
             </a:fld>
             <a:endParaRPr lang="en-US"/>
           </a:p>
@@ -4863,7 +4903,7 @@
           <a:p>
             <a:fld id="{3D825227-59CF-4F1C-888A-6CDEA0B8E749}" type="datetimeFigureOut">
               <a:rPr lang="en-US" smtClean="0"/>
-              <a:t>10/25/2018</a:t>
+              <a:t>10/30/2018</a:t>
             </a:fld>
             <a:endParaRPr lang="en-US"/>
           </a:p>
@@ -5138,7 +5178,7 @@
           <a:p>
             <a:fld id="{3D825227-59CF-4F1C-888A-6CDEA0B8E749}" type="datetimeFigureOut">
               <a:rPr lang="en-US" smtClean="0"/>
-              <a:t>10/25/2018</a:t>
+              <a:t>10/30/2018</a:t>
             </a:fld>
             <a:endParaRPr lang="en-US"/>
           </a:p>
@@ -5403,7 +5443,7 @@
           <a:p>
             <a:fld id="{3D825227-59CF-4F1C-888A-6CDEA0B8E749}" type="datetimeFigureOut">
               <a:rPr lang="en-US" smtClean="0"/>
-              <a:t>10/25/2018</a:t>
+              <a:t>10/30/2018</a:t>
             </a:fld>
             <a:endParaRPr lang="en-US"/>
           </a:p>
@@ -5815,7 +5855,7 @@
           <a:p>
             <a:fld id="{3D825227-59CF-4F1C-888A-6CDEA0B8E749}" type="datetimeFigureOut">
               <a:rPr lang="en-US" smtClean="0"/>
-              <a:t>10/25/2018</a:t>
+              <a:t>10/30/2018</a:t>
             </a:fld>
             <a:endParaRPr lang="en-US"/>
           </a:p>
@@ -5956,7 +5996,7 @@
           <a:p>
             <a:fld id="{3D825227-59CF-4F1C-888A-6CDEA0B8E749}" type="datetimeFigureOut">
               <a:rPr lang="en-US" smtClean="0"/>
-              <a:t>10/25/2018</a:t>
+              <a:t>10/30/2018</a:t>
             </a:fld>
             <a:endParaRPr lang="en-US"/>
           </a:p>
@@ -6069,7 +6109,7 @@
           <a:p>
             <a:fld id="{3D825227-59CF-4F1C-888A-6CDEA0B8E749}" type="datetimeFigureOut">
               <a:rPr lang="en-US" smtClean="0"/>
-              <a:t>10/25/2018</a:t>
+              <a:t>10/30/2018</a:t>
             </a:fld>
             <a:endParaRPr lang="en-US"/>
           </a:p>
@@ -6380,7 +6420,7 @@
           <a:p>
             <a:fld id="{3D825227-59CF-4F1C-888A-6CDEA0B8E749}" type="datetimeFigureOut">
               <a:rPr lang="en-US" smtClean="0"/>
-              <a:t>10/25/2018</a:t>
+              <a:t>10/30/2018</a:t>
             </a:fld>
             <a:endParaRPr lang="en-US"/>
           </a:p>
@@ -6668,7 +6708,7 @@
           <a:p>
             <a:fld id="{3D825227-59CF-4F1C-888A-6CDEA0B8E749}" type="datetimeFigureOut">
               <a:rPr lang="en-US" smtClean="0"/>
-              <a:t>10/25/2018</a:t>
+              <a:t>10/30/2018</a:t>
             </a:fld>
             <a:endParaRPr lang="en-US"/>
           </a:p>
@@ -6909,7 +6949,7 @@
           <a:p>
             <a:fld id="{3D825227-59CF-4F1C-888A-6CDEA0B8E749}" type="datetimeFigureOut">
               <a:rPr lang="en-US" smtClean="0"/>
-              <a:t>10/25/2018</a:t>
+              <a:t>10/30/2018</a:t>
             </a:fld>
             <a:endParaRPr lang="en-US"/>
           </a:p>
@@ -20535,98 +20575,6 @@
           </a:p>
         </p:txBody>
       </p:sp>
-      <p:cxnSp>
-        <p:nvCxnSpPr>
-          <p:cNvPr id="28" name="Straight Arrow Connector 16">
-            <a:extLst>
-              <a:ext uri="{FF2B5EF4-FFF2-40B4-BE49-F238E27FC236}">
-                <a16:creationId xmlns:a16="http://schemas.microsoft.com/office/drawing/2014/main" id="{E1CD74DF-9709-44FF-82FB-BF08B3FA66DB}"/>
-              </a:ext>
-            </a:extLst>
-          </p:cNvPr>
-          <p:cNvCxnSpPr>
-            <a:cxnSpLocks/>
-            <a:stCxn id="20" idx="4"/>
-            <a:endCxn id="4" idx="0"/>
-          </p:cNvCxnSpPr>
-          <p:nvPr/>
-        </p:nvCxnSpPr>
-        <p:spPr>
-          <a:xfrm rot="16200000" flipH="1">
-            <a:off x="2790504" y="3907858"/>
-            <a:ext cx="827090" cy="6349"/>
-          </a:xfrm>
-          <a:prstGeom prst="curvedConnector3">
-            <a:avLst>
-              <a:gd name="adj1" fmla="val 50000"/>
-            </a:avLst>
-          </a:prstGeom>
-          <a:ln w="38100" cap="sq">
-            <a:miter lim="800000"/>
-            <a:headEnd type="triangle" w="lg" len="med"/>
-            <a:tailEnd type="none" w="lg" len="med"/>
-          </a:ln>
-        </p:spPr>
-        <p:style>
-          <a:lnRef idx="3">
-            <a:schemeClr val="dk1"/>
-          </a:lnRef>
-          <a:fillRef idx="0">
-            <a:schemeClr val="dk1"/>
-          </a:fillRef>
-          <a:effectRef idx="2">
-            <a:schemeClr val="dk1"/>
-          </a:effectRef>
-          <a:fontRef idx="minor">
-            <a:schemeClr val="tx1"/>
-          </a:fontRef>
-        </p:style>
-      </p:cxnSp>
-      <p:cxnSp>
-        <p:nvCxnSpPr>
-          <p:cNvPr id="30" name="Straight Arrow Connector 16">
-            <a:extLst>
-              <a:ext uri="{FF2B5EF4-FFF2-40B4-BE49-F238E27FC236}">
-                <a16:creationId xmlns:a16="http://schemas.microsoft.com/office/drawing/2014/main" id="{05C56F41-48DC-46BB-BE20-2C405AB77A73}"/>
-              </a:ext>
-            </a:extLst>
-          </p:cNvPr>
-          <p:cNvCxnSpPr>
-            <a:cxnSpLocks/>
-            <a:stCxn id="25" idx="4"/>
-            <a:endCxn id="4" idx="6"/>
-          </p:cNvCxnSpPr>
-          <p:nvPr/>
-        </p:nvCxnSpPr>
-        <p:spPr>
-          <a:xfrm rot="5400000">
-            <a:off x="5723177" y="1827277"/>
-            <a:ext cx="1588624" cy="4929045"/>
-          </a:xfrm>
-          <a:prstGeom prst="curvedConnector2">
-            <a:avLst/>
-          </a:prstGeom>
-          <a:ln w="38100" cap="sq">
-            <a:miter lim="800000"/>
-            <a:headEnd type="triangle" w="lg" len="med"/>
-            <a:tailEnd type="triangle" w="lg" len="med"/>
-          </a:ln>
-        </p:spPr>
-        <p:style>
-          <a:lnRef idx="3">
-            <a:schemeClr val="dk1"/>
-          </a:lnRef>
-          <a:fillRef idx="0">
-            <a:schemeClr val="dk1"/>
-          </a:fillRef>
-          <a:effectRef idx="2">
-            <a:schemeClr val="dk1"/>
-          </a:effectRef>
-          <a:fontRef idx="minor">
-            <a:schemeClr val="tx1"/>
-          </a:fontRef>
-        </p:style>
-      </p:cxnSp>
       <p:sp>
         <p:nvSpPr>
           <p:cNvPr id="19" name="Rectangle 18">
@@ -21078,95 +21026,6 @@
       </p:cxnSp>
       <p:cxnSp>
         <p:nvCxnSpPr>
-          <p:cNvPr id="36" name="Straight Arrow Connector 16">
-            <a:extLst>
-              <a:ext uri="{FF2B5EF4-FFF2-40B4-BE49-F238E27FC236}">
-                <a16:creationId xmlns:a16="http://schemas.microsoft.com/office/drawing/2014/main" id="{887E1878-1850-4632-B8BB-CC6D6A0102A3}"/>
-              </a:ext>
-            </a:extLst>
-          </p:cNvPr>
-          <p:cNvCxnSpPr>
-            <a:cxnSpLocks/>
-            <a:stCxn id="20" idx="5"/>
-            <a:endCxn id="4" idx="7"/>
-          </p:cNvCxnSpPr>
-          <p:nvPr/>
-        </p:nvCxnSpPr>
-        <p:spPr>
-          <a:xfrm rot="16200000" flipH="1">
-            <a:off x="3132092" y="3874464"/>
-            <a:ext cx="1156418" cy="189906"/>
-          </a:xfrm>
-          <a:prstGeom prst="curvedConnector3">
-            <a:avLst>
-              <a:gd name="adj1" fmla="val 48783"/>
-            </a:avLst>
-          </a:prstGeom>
-          <a:ln w="38100" cap="sq">
-            <a:solidFill>
-              <a:srgbClr val="00B050"/>
-            </a:solidFill>
-            <a:miter lim="800000"/>
-            <a:headEnd type="triangle" w="lg" len="med"/>
-            <a:tailEnd type="none" w="lg" len="med"/>
-          </a:ln>
-        </p:spPr>
-        <p:style>
-          <a:lnRef idx="3">
-            <a:schemeClr val="dk1"/>
-          </a:lnRef>
-          <a:fillRef idx="0">
-            <a:schemeClr val="dk1"/>
-          </a:fillRef>
-          <a:effectRef idx="2">
-            <a:schemeClr val="dk1"/>
-          </a:effectRef>
-          <a:fontRef idx="minor">
-            <a:schemeClr val="tx1"/>
-          </a:fontRef>
-        </p:style>
-      </p:cxnSp>
-      <p:sp>
-        <p:nvSpPr>
-          <p:cNvPr id="38" name="TextBox 37">
-            <a:extLst>
-              <a:ext uri="{FF2B5EF4-FFF2-40B4-BE49-F238E27FC236}">
-                <a16:creationId xmlns:a16="http://schemas.microsoft.com/office/drawing/2014/main" id="{F6FD4A65-CCD6-41B7-A41B-9C7C91D7FDD5}"/>
-              </a:ext>
-            </a:extLst>
-          </p:cNvPr>
-          <p:cNvSpPr txBox="1"/>
-          <p:nvPr/>
-        </p:nvSpPr>
-        <p:spPr>
-          <a:xfrm>
-            <a:off x="3844931" y="3509196"/>
-            <a:ext cx="3850751" cy="646331"/>
-          </a:xfrm>
-          <a:prstGeom prst="rect">
-            <a:avLst/>
-          </a:prstGeom>
-          <a:noFill/>
-        </p:spPr>
-        <p:txBody>
-          <a:bodyPr wrap="square" rtlCol="0">
-            <a:spAutoFit/>
-          </a:bodyPr>
-          <a:lstStyle/>
-          <a:p>
-            <a:r>
-              <a:rPr lang="en-US" b="1" dirty="0">
-                <a:solidFill>
-                  <a:srgbClr val="00B050"/>
-                </a:solidFill>
-              </a:rPr>
-              <a:t>1. Direct communication either with the head switch or with the tail switch</a:t>
-            </a:r>
-          </a:p>
-        </p:txBody>
-      </p:sp>
-      <p:cxnSp>
-        <p:nvCxnSpPr>
           <p:cNvPr id="42" name="Straight Arrow Connector 16">
             <a:extLst>
               <a:ext uri="{FF2B5EF4-FFF2-40B4-BE49-F238E27FC236}">
@@ -21274,53 +21133,6 @@
           </a:p>
         </p:txBody>
       </p:sp>
-      <p:cxnSp>
-        <p:nvCxnSpPr>
-          <p:cNvPr id="50" name="Straight Arrow Connector 16">
-            <a:extLst>
-              <a:ext uri="{FF2B5EF4-FFF2-40B4-BE49-F238E27FC236}">
-                <a16:creationId xmlns:a16="http://schemas.microsoft.com/office/drawing/2014/main" id="{C8339DFD-6149-493F-AC39-C8FCB660BA7A}"/>
-              </a:ext>
-            </a:extLst>
-          </p:cNvPr>
-          <p:cNvCxnSpPr>
-            <a:cxnSpLocks/>
-            <a:endCxn id="25" idx="5"/>
-          </p:cNvCxnSpPr>
-          <p:nvPr/>
-        </p:nvCxnSpPr>
-        <p:spPr>
-          <a:xfrm flipV="1">
-            <a:off x="4052968" y="3391207"/>
-            <a:ext cx="5343516" cy="1971208"/>
-          </a:xfrm>
-          <a:prstGeom prst="curvedConnector2">
-            <a:avLst/>
-          </a:prstGeom>
-          <a:ln w="38100" cap="sq">
-            <a:solidFill>
-              <a:srgbClr val="0070C0"/>
-            </a:solidFill>
-            <a:miter lim="800000"/>
-            <a:headEnd type="triangle" w="lg" len="med"/>
-            <a:tailEnd type="none" w="lg" len="med"/>
-          </a:ln>
-        </p:spPr>
-        <p:style>
-          <a:lnRef idx="3">
-            <a:schemeClr val="dk1"/>
-          </a:lnRef>
-          <a:fillRef idx="0">
-            <a:schemeClr val="dk1"/>
-          </a:fillRef>
-          <a:effectRef idx="2">
-            <a:schemeClr val="dk1"/>
-          </a:effectRef>
-          <a:fontRef idx="minor">
-            <a:schemeClr val="tx1"/>
-          </a:fontRef>
-        </p:style>
-      </p:cxnSp>
       <p:sp>
         <p:nvSpPr>
           <p:cNvPr id="24" name="TextBox 23">
@@ -21598,6 +21410,234 @@
           </a:p>
         </p:txBody>
       </p:sp>
+      <p:cxnSp>
+        <p:nvCxnSpPr>
+          <p:cNvPr id="28" name="Straight Arrow Connector 16">
+            <a:extLst>
+              <a:ext uri="{FF2B5EF4-FFF2-40B4-BE49-F238E27FC236}">
+                <a16:creationId xmlns:a16="http://schemas.microsoft.com/office/drawing/2014/main" id="{E1CD74DF-9709-44FF-82FB-BF08B3FA66DB}"/>
+              </a:ext>
+            </a:extLst>
+          </p:cNvPr>
+          <p:cNvCxnSpPr>
+            <a:cxnSpLocks/>
+            <a:stCxn id="20" idx="4"/>
+            <a:endCxn id="4" idx="0"/>
+          </p:cNvCxnSpPr>
+          <p:nvPr/>
+        </p:nvCxnSpPr>
+        <p:spPr>
+          <a:xfrm rot="16200000" flipH="1">
+            <a:off x="2790504" y="3907858"/>
+            <a:ext cx="827090" cy="6349"/>
+          </a:xfrm>
+          <a:prstGeom prst="curvedConnector3">
+            <a:avLst>
+              <a:gd name="adj1" fmla="val 50000"/>
+            </a:avLst>
+          </a:prstGeom>
+          <a:ln w="38100" cap="sq">
+            <a:miter lim="800000"/>
+            <a:headEnd type="triangle" w="lg" len="med"/>
+            <a:tailEnd type="none" w="lg" len="med"/>
+          </a:ln>
+        </p:spPr>
+        <p:style>
+          <a:lnRef idx="3">
+            <a:schemeClr val="dk1"/>
+          </a:lnRef>
+          <a:fillRef idx="0">
+            <a:schemeClr val="dk1"/>
+          </a:fillRef>
+          <a:effectRef idx="2">
+            <a:schemeClr val="dk1"/>
+          </a:effectRef>
+          <a:fontRef idx="minor">
+            <a:schemeClr val="tx1"/>
+          </a:fontRef>
+        </p:style>
+      </p:cxnSp>
+      <p:cxnSp>
+        <p:nvCxnSpPr>
+          <p:cNvPr id="30" name="Straight Arrow Connector 16">
+            <a:extLst>
+              <a:ext uri="{FF2B5EF4-FFF2-40B4-BE49-F238E27FC236}">
+                <a16:creationId xmlns:a16="http://schemas.microsoft.com/office/drawing/2014/main" id="{05C56F41-48DC-46BB-BE20-2C405AB77A73}"/>
+              </a:ext>
+            </a:extLst>
+          </p:cNvPr>
+          <p:cNvCxnSpPr>
+            <a:cxnSpLocks/>
+            <a:stCxn id="25" idx="4"/>
+            <a:endCxn id="4" idx="6"/>
+          </p:cNvCxnSpPr>
+          <p:nvPr/>
+        </p:nvCxnSpPr>
+        <p:spPr>
+          <a:xfrm rot="5400000">
+            <a:off x="5723177" y="1827277"/>
+            <a:ext cx="1588624" cy="4929045"/>
+          </a:xfrm>
+          <a:prstGeom prst="curvedConnector2">
+            <a:avLst/>
+          </a:prstGeom>
+          <a:ln w="38100" cap="sq">
+            <a:miter lim="800000"/>
+            <a:headEnd type="triangle" w="lg" len="med"/>
+            <a:tailEnd type="triangle" w="lg" len="med"/>
+          </a:ln>
+        </p:spPr>
+        <p:style>
+          <a:lnRef idx="3">
+            <a:schemeClr val="dk1"/>
+          </a:lnRef>
+          <a:fillRef idx="0">
+            <a:schemeClr val="dk1"/>
+          </a:fillRef>
+          <a:effectRef idx="2">
+            <a:schemeClr val="dk1"/>
+          </a:effectRef>
+          <a:fontRef idx="minor">
+            <a:schemeClr val="tx1"/>
+          </a:fontRef>
+        </p:style>
+      </p:cxnSp>
+      <p:sp>
+        <p:nvSpPr>
+          <p:cNvPr id="38" name="TextBox 37">
+            <a:extLst>
+              <a:ext uri="{FF2B5EF4-FFF2-40B4-BE49-F238E27FC236}">
+                <a16:creationId xmlns:a16="http://schemas.microsoft.com/office/drawing/2014/main" id="{F6FD4A65-CCD6-41B7-A41B-9C7C91D7FDD5}"/>
+              </a:ext>
+            </a:extLst>
+          </p:cNvPr>
+          <p:cNvSpPr txBox="1"/>
+          <p:nvPr/>
+        </p:nvSpPr>
+        <p:spPr>
+          <a:xfrm>
+            <a:off x="3844931" y="3509196"/>
+            <a:ext cx="3850751" cy="646331"/>
+          </a:xfrm>
+          <a:prstGeom prst="rect">
+            <a:avLst/>
+          </a:prstGeom>
+          <a:noFill/>
+        </p:spPr>
+        <p:txBody>
+          <a:bodyPr wrap="square" rtlCol="0">
+            <a:spAutoFit/>
+          </a:bodyPr>
+          <a:lstStyle/>
+          <a:p>
+            <a:r>
+              <a:rPr lang="en-US" b="1" dirty="0">
+                <a:solidFill>
+                  <a:srgbClr val="00B050"/>
+                </a:solidFill>
+              </a:rPr>
+              <a:t>1. Direct communication either with the head switch or with the tail switch</a:t>
+            </a:r>
+          </a:p>
+        </p:txBody>
+      </p:sp>
+      <p:cxnSp>
+        <p:nvCxnSpPr>
+          <p:cNvPr id="50" name="Straight Arrow Connector 16">
+            <a:extLst>
+              <a:ext uri="{FF2B5EF4-FFF2-40B4-BE49-F238E27FC236}">
+                <a16:creationId xmlns:a16="http://schemas.microsoft.com/office/drawing/2014/main" id="{C8339DFD-6149-493F-AC39-C8FCB660BA7A}"/>
+              </a:ext>
+            </a:extLst>
+          </p:cNvPr>
+          <p:cNvCxnSpPr>
+            <a:cxnSpLocks/>
+            <a:endCxn id="25" idx="5"/>
+          </p:cNvCxnSpPr>
+          <p:nvPr/>
+        </p:nvCxnSpPr>
+        <p:spPr>
+          <a:xfrm flipV="1">
+            <a:off x="4052968" y="3391207"/>
+            <a:ext cx="5343516" cy="1971208"/>
+          </a:xfrm>
+          <a:prstGeom prst="curvedConnector2">
+            <a:avLst/>
+          </a:prstGeom>
+          <a:ln w="38100" cap="sq">
+            <a:solidFill>
+              <a:srgbClr val="0070C0"/>
+            </a:solidFill>
+            <a:miter lim="800000"/>
+            <a:headEnd type="triangle" w="lg" len="med"/>
+            <a:tailEnd type="none" w="lg" len="med"/>
+          </a:ln>
+        </p:spPr>
+        <p:style>
+          <a:lnRef idx="3">
+            <a:schemeClr val="dk1"/>
+          </a:lnRef>
+          <a:fillRef idx="0">
+            <a:schemeClr val="dk1"/>
+          </a:fillRef>
+          <a:effectRef idx="2">
+            <a:schemeClr val="dk1"/>
+          </a:effectRef>
+          <a:fontRef idx="minor">
+            <a:schemeClr val="tx1"/>
+          </a:fontRef>
+        </p:style>
+      </p:cxnSp>
+      <p:cxnSp>
+        <p:nvCxnSpPr>
+          <p:cNvPr id="36" name="Straight Arrow Connector 16">
+            <a:extLst>
+              <a:ext uri="{FF2B5EF4-FFF2-40B4-BE49-F238E27FC236}">
+                <a16:creationId xmlns:a16="http://schemas.microsoft.com/office/drawing/2014/main" id="{887E1878-1850-4632-B8BB-CC6D6A0102A3}"/>
+              </a:ext>
+            </a:extLst>
+          </p:cNvPr>
+          <p:cNvCxnSpPr>
+            <a:cxnSpLocks/>
+            <a:stCxn id="20" idx="5"/>
+            <a:endCxn id="4" idx="7"/>
+          </p:cNvCxnSpPr>
+          <p:nvPr/>
+        </p:nvCxnSpPr>
+        <p:spPr>
+          <a:xfrm rot="16200000" flipH="1">
+            <a:off x="3132092" y="3874464"/>
+            <a:ext cx="1156418" cy="189906"/>
+          </a:xfrm>
+          <a:prstGeom prst="curvedConnector3">
+            <a:avLst>
+              <a:gd name="adj1" fmla="val 48783"/>
+            </a:avLst>
+          </a:prstGeom>
+          <a:ln w="38100" cap="sq">
+            <a:solidFill>
+              <a:srgbClr val="00B050"/>
+            </a:solidFill>
+            <a:miter lim="800000"/>
+            <a:headEnd type="triangle" w="lg" len="med"/>
+            <a:tailEnd type="none" w="lg" len="med"/>
+          </a:ln>
+        </p:spPr>
+        <p:style>
+          <a:lnRef idx="3">
+            <a:schemeClr val="dk1"/>
+          </a:lnRef>
+          <a:fillRef idx="0">
+            <a:schemeClr val="dk1"/>
+          </a:fillRef>
+          <a:effectRef idx="2">
+            <a:schemeClr val="dk1"/>
+          </a:effectRef>
+          <a:fontRef idx="minor">
+            <a:schemeClr val="tx1"/>
+          </a:fontRef>
+        </p:style>
+      </p:cxnSp>
     </p:spTree>
     <p:extLst>
       <p:ext uri="{BB962C8B-B14F-4D97-AF65-F5344CB8AC3E}">

</xml_diff>